<commit_message>
enhanced slides 2 and 3
</commit_message>
<xml_diff>
--- a/03-Static fields and methods.pptx
+++ b/03-Static fields and methods.pptx
@@ -3037,7 +3037,7 @@
           <a:p>
             <a:fld id="{86D088FE-3E68-47FE-8BA4-634CD34BABBC}" type="datetimeFigureOut">
               <a:rPr lang="en-GB" smtClean="0"/>
-              <a:t>05/12/2025</a:t>
+              <a:t>09/12/2025</a:t>
             </a:fld>
             <a:endParaRPr lang="en-GB"/>
           </a:p>
@@ -3202,7 +3202,7 @@
           <a:p>
             <a:fld id="{1D6B66C6-1E92-0F4E-A300-9D4ED1F0C23F}" type="datetimeFigureOut">
               <a:rPr lang="en-GB" smtClean="0"/>
-              <a:t>05/12/2025</a:t>
+              <a:t>09/12/2025</a:t>
             </a:fld>
             <a:endParaRPr lang="en-GB"/>
           </a:p>
@@ -26959,6 +26959,24 @@
               <a:t>public </a:t>
             </a:r>
             <a:r>
+              <a:rPr lang="en-GB" sz="2000" b="1" dirty="0" err="1">
+                <a:solidFill>
+                  <a:srgbClr val="0000FF"/>
+                </a:solidFill>
+                <a:latin typeface="Consolas" panose="020B0609020204030204" pitchFamily="49" charset="0"/>
+              </a:rPr>
+              <a:t>readonly</a:t>
+            </a:r>
+            <a:r>
+              <a:rPr lang="en-GB" sz="1800" dirty="0">
+                <a:solidFill>
+                  <a:srgbClr val="0000FF"/>
+                </a:solidFill>
+                <a:latin typeface="Consolas" panose="020B0609020204030204" pitchFamily="49" charset="0"/>
+              </a:rPr>
+              <a:t> </a:t>
+            </a:r>
+            <a:r>
               <a:rPr lang="en-GB" dirty="0">
                 <a:solidFill>
                   <a:srgbClr val="000000"/>
@@ -28271,8 +28289,8 @@
         </p:nvSpPr>
         <p:spPr bwMode="auto">
           <a:xfrm>
-            <a:off x="1040668" y="1515118"/>
-            <a:ext cx="9708612" cy="4521751"/>
+            <a:off x="1040667" y="1515118"/>
+            <a:ext cx="10043343" cy="3829253"/>
           </a:xfrm>
           <a:prstGeom prst="rect">
             <a:avLst/>
@@ -28328,7 +28346,7 @@
                 </a:solidFill>
                 <a:latin typeface="Lucida Console" pitchFamily="49" charset="0"/>
               </a:rPr>
-              <a:t> Car {</a:t>
+              <a:t> Product {</a:t>
             </a:r>
           </a:p>
           <a:p>
@@ -28401,7 +28419,25 @@
                 </a:solidFill>
                 <a:latin typeface="Lucida Console" pitchFamily="49" charset="0"/>
               </a:rPr>
-              <a:t>double VAT = 0.2;</a:t>
+              <a:t>double </a:t>
+            </a:r>
+            <a:r>
+              <a:rPr lang="en-GB" b="1" dirty="0">
+                <a:solidFill>
+                  <a:srgbClr val="000000"/>
+                </a:solidFill>
+                <a:latin typeface="Lucida Console" pitchFamily="49" charset="0"/>
+              </a:rPr>
+              <a:t>DISCOUNT</a:t>
+            </a:r>
+            <a:r>
+              <a:rPr lang="en-GB" dirty="0">
+                <a:solidFill>
+                  <a:srgbClr val="000000"/>
+                </a:solidFill>
+                <a:latin typeface="Lucida Console" pitchFamily="49" charset="0"/>
+              </a:rPr>
+              <a:t> = 0.1;</a:t>
             </a:r>
           </a:p>
           <a:p>
@@ -28438,7 +28474,7 @@
                 </a:solidFill>
                 <a:latin typeface="Lucida Console" pitchFamily="49" charset="0"/>
               </a:rPr>
-              <a:t>  </a:t>
+              <a:t>❌  </a:t>
             </a:r>
             <a:r>
               <a:rPr lang="en-GB" dirty="0">
@@ -28531,6 +28567,9 @@
           </a:p>
           <a:p>
             <a:pPr defTabSz="739775" eaLnBrk="0" hangingPunct="0">
+              <a:lnSpc>
+                <a:spcPct val="150000"/>
+              </a:lnSpc>
               <a:tabLst>
                 <a:tab pos="341313" algn="l"/>
                 <a:tab pos="690563" algn="l"/>
@@ -28564,7 +28603,7 @@
                 </a:solidFill>
                 <a:latin typeface="Lucida Console" pitchFamily="49" charset="0"/>
               </a:rPr>
-              <a:t> Car() {	</a:t>
+              <a:t> Product() {	</a:t>
             </a:r>
             <a:br>
               <a:rPr lang="en-GB" dirty="0">
@@ -28581,7 +28620,25 @@
                 </a:solidFill>
                 <a:latin typeface="Lucida Console" pitchFamily="49" charset="0"/>
               </a:rPr>
-              <a:t>     VAT = 0.15;</a:t>
+              <a:t> 		</a:t>
+            </a:r>
+            <a:r>
+              <a:rPr lang="en-GB" b="1" dirty="0">
+                <a:solidFill>
+                  <a:srgbClr val="000000"/>
+                </a:solidFill>
+                <a:latin typeface="Lucida Console" pitchFamily="49" charset="0"/>
+              </a:rPr>
+              <a:t>DISCOUNT</a:t>
+            </a:r>
+            <a:r>
+              <a:rPr lang="en-GB" dirty="0">
+                <a:solidFill>
+                  <a:srgbClr val="000000"/>
+                </a:solidFill>
+                <a:latin typeface="Lucida Console" pitchFamily="49" charset="0"/>
+              </a:rPr>
+              <a:t> = 0.15; ❌</a:t>
             </a:r>
             <a:br>
               <a:rPr lang="en-GB" dirty="0">
@@ -28635,161 +28692,6 @@
                 </a:solidFill>
                 <a:latin typeface="Lucida Console" pitchFamily="49" charset="0"/>
               </a:rPr>
-              <a:t>  </a:t>
-            </a:r>
-            <a:r>
-              <a:rPr lang="en-GB" dirty="0">
-                <a:solidFill>
-                  <a:srgbClr val="0000C8"/>
-                </a:solidFill>
-                <a:latin typeface="Lucida Console" pitchFamily="49" charset="0"/>
-              </a:rPr>
-              <a:t>public</a:t>
-            </a:r>
-            <a:r>
-              <a:rPr lang="en-GB" dirty="0">
-                <a:solidFill>
-                  <a:srgbClr val="000000"/>
-                </a:solidFill>
-                <a:latin typeface="Lucida Console" pitchFamily="49" charset="0"/>
-              </a:rPr>
-              <a:t> </a:t>
-            </a:r>
-            <a:r>
-              <a:rPr lang="en-GB" sz="1800" dirty="0">
-                <a:solidFill>
-                  <a:srgbClr val="0000FF"/>
-                </a:solidFill>
-                <a:latin typeface="Cascadia Mono" panose="020B0609020000020004" pitchFamily="49" charset="0"/>
-              </a:rPr>
-              <a:t>void</a:t>
-            </a:r>
-            <a:r>
-              <a:rPr lang="en-GB" sz="1800" dirty="0">
-                <a:solidFill>
-                  <a:srgbClr val="000000"/>
-                </a:solidFill>
-                <a:latin typeface="Cascadia Mono" panose="020B0609020000020004" pitchFamily="49" charset="0"/>
-              </a:rPr>
-              <a:t> </a:t>
-            </a:r>
-            <a:r>
-              <a:rPr lang="en-GB" dirty="0" err="1">
-                <a:solidFill>
-                  <a:srgbClr val="000000"/>
-                </a:solidFill>
-                <a:latin typeface="Lucida Console" pitchFamily="49" charset="0"/>
-              </a:rPr>
-              <a:t>ChangeYearOfCreation</a:t>
-            </a:r>
-            <a:r>
-              <a:rPr lang="en-GB" dirty="0">
-                <a:solidFill>
-                  <a:srgbClr val="000000"/>
-                </a:solidFill>
-                <a:latin typeface="Lucida Console" pitchFamily="49" charset="0"/>
-              </a:rPr>
-              <a:t>() {	</a:t>
-            </a:r>
-            <a:br>
-              <a:rPr lang="en-GB" dirty="0">
-                <a:solidFill>
-                  <a:srgbClr val="000000"/>
-                </a:solidFill>
-                <a:latin typeface="Lucida Console" pitchFamily="49" charset="0"/>
-              </a:rPr>
-            </a:br>
-            <a:endParaRPr lang="en-GB" dirty="0">
-              <a:solidFill>
-                <a:srgbClr val="000000"/>
-              </a:solidFill>
-              <a:latin typeface="Lucida Console" pitchFamily="49" charset="0"/>
-            </a:endParaRPr>
-          </a:p>
-          <a:p>
-            <a:pPr defTabSz="739775" eaLnBrk="0" hangingPunct="0">
-              <a:tabLst>
-                <a:tab pos="341313" algn="l"/>
-                <a:tab pos="690563" algn="l"/>
-                <a:tab pos="1030288" algn="l"/>
-                <a:tab pos="1371600" algn="l"/>
-              </a:tabLst>
-              <a:defRPr/>
-            </a:pPr>
-            <a:r>
-              <a:rPr lang="en-GB" dirty="0">
-                <a:solidFill>
-                  <a:srgbClr val="000000"/>
-                </a:solidFill>
-                <a:latin typeface="Lucida Console" pitchFamily="49" charset="0"/>
-              </a:rPr>
-              <a:t>     </a:t>
-            </a:r>
-            <a:r>
-              <a:rPr lang="en-GB" b="1" dirty="0" err="1">
-                <a:solidFill>
-                  <a:srgbClr val="000000"/>
-                </a:solidFill>
-                <a:latin typeface="Lucida Console" pitchFamily="49" charset="0"/>
-              </a:rPr>
-              <a:t>yearOfCreation</a:t>
-            </a:r>
-            <a:r>
-              <a:rPr lang="en-GB" b="1" dirty="0">
-                <a:solidFill>
-                  <a:srgbClr val="000000"/>
-                </a:solidFill>
-                <a:latin typeface="Lucida Console" pitchFamily="49" charset="0"/>
-              </a:rPr>
-              <a:t>++</a:t>
-            </a:r>
-            <a:r>
-              <a:rPr lang="en-GB" dirty="0">
-                <a:solidFill>
-                  <a:srgbClr val="000000"/>
-                </a:solidFill>
-                <a:latin typeface="Lucida Console" pitchFamily="49" charset="0"/>
-              </a:rPr>
-              <a:t>; </a:t>
-            </a:r>
-          </a:p>
-          <a:p>
-            <a:pPr defTabSz="739775" eaLnBrk="0" hangingPunct="0">
-              <a:tabLst>
-                <a:tab pos="341313" algn="l"/>
-                <a:tab pos="690563" algn="l"/>
-                <a:tab pos="1030288" algn="l"/>
-                <a:tab pos="1371600" algn="l"/>
-              </a:tabLst>
-              <a:defRPr/>
-            </a:pPr>
-            <a:r>
-              <a:rPr lang="en-GB" dirty="0">
-                <a:solidFill>
-                  <a:srgbClr val="000000"/>
-                </a:solidFill>
-                <a:latin typeface="Lucida Console" pitchFamily="49" charset="0"/>
-              </a:rPr>
-              <a:t>  }</a:t>
-            </a:r>
-          </a:p>
-          <a:p>
-            <a:pPr defTabSz="739775" eaLnBrk="0" hangingPunct="0">
-              <a:tabLst>
-                <a:tab pos="341313" algn="l"/>
-                <a:tab pos="690563" algn="l"/>
-                <a:tab pos="1030288" algn="l"/>
-                <a:tab pos="1371600" algn="l"/>
-              </a:tabLst>
-              <a:defRPr/>
-            </a:pPr>
-            <a:r>
-              <a:rPr lang="en-GB" dirty="0">
-                <a:solidFill>
-                  <a:srgbClr val="000000"/>
-                </a:solidFill>
-                <a:latin typeface="Lucida Console" pitchFamily="49" charset="0"/>
-              </a:rPr>
               <a:t>}</a:t>
             </a:r>
             <a:endParaRPr lang="en-GB" dirty="0">
@@ -28798,58 +28700,6 @@
               </a:solidFill>
               <a:latin typeface="Lucida Console" pitchFamily="49" charset="0"/>
             </a:endParaRPr>
-          </a:p>
-        </p:txBody>
-      </p:sp>
-      <p:sp>
-        <p:nvSpPr>
-          <p:cNvPr id="2" name="Rectangle 21">
-            <a:extLst>
-              <a:ext uri="{FF2B5EF4-FFF2-40B4-BE49-F238E27FC236}">
-                <a16:creationId xmlns:a16="http://schemas.microsoft.com/office/drawing/2014/main" id="{3CA1CBA6-221F-594E-64AB-CCAB613AAAEF}"/>
-              </a:ext>
-            </a:extLst>
-          </p:cNvPr>
-          <p:cNvSpPr>
-            <a:spLocks noChangeArrowheads="1"/>
-          </p:cNvSpPr>
-          <p:nvPr/>
-        </p:nvSpPr>
-        <p:spPr bwMode="auto">
-          <a:xfrm>
-            <a:off x="3401937" y="3626654"/>
-            <a:ext cx="476250" cy="698500"/>
-          </a:xfrm>
-          <a:prstGeom prst="rect">
-            <a:avLst/>
-          </a:prstGeom>
-          <a:noFill/>
-          <a:ln w="12700">
-            <a:noFill/>
-            <a:miter lim="800000"/>
-            <a:headEnd/>
-            <a:tailEnd/>
-          </a:ln>
-          <a:effectLst/>
-        </p:spPr>
-        <p:txBody>
-          <a:bodyPr lIns="90488" tIns="44450" rIns="90488" bIns="44450">
-            <a:spAutoFit/>
-          </a:bodyPr>
-          <a:lstStyle/>
-          <a:p>
-            <a:pPr defTabSz="739775" eaLnBrk="0" hangingPunct="0">
-              <a:defRPr/>
-            </a:pPr>
-            <a:r>
-              <a:rPr lang="en-US" sz="4000" dirty="0">
-                <a:solidFill>
-                  <a:srgbClr val="FF3300"/>
-                </a:solidFill>
-                <a:latin typeface="Wingdings" pitchFamily="2" charset="2"/>
-              </a:rPr>
-              <a:t></a:t>
-            </a:r>
           </a:p>
         </p:txBody>
       </p:sp>
@@ -28867,7 +28717,7 @@
         </p:nvSpPr>
         <p:spPr>
           <a:xfrm>
-            <a:off x="4346817" y="3248735"/>
+            <a:off x="5063509" y="3647440"/>
             <a:ext cx="4817503" cy="398705"/>
           </a:xfrm>
           <a:prstGeom prst="wedgeRoundRectCallout">
@@ -28937,7 +28787,7 @@
         </p:nvSpPr>
         <p:spPr>
           <a:xfrm>
-            <a:off x="6023217" y="2062479"/>
+            <a:off x="6661070" y="2049412"/>
             <a:ext cx="4248543" cy="398705"/>
           </a:xfrm>
           <a:prstGeom prst="wedgeRoundRectCallout">
@@ -29007,7 +28857,7 @@
         </p:nvSpPr>
         <p:spPr>
           <a:xfrm>
-            <a:off x="6968097" y="2682239"/>
+            <a:off x="7141092" y="2682239"/>
             <a:ext cx="3029343" cy="398705"/>
           </a:xfrm>
           <a:prstGeom prst="wedgeRoundRectCallout">
@@ -29062,58 +28912,6 @@
                 </a:solidFill>
               </a:rPr>
               <a:t>Has to be a constant value</a:t>
-            </a:r>
-          </a:p>
-        </p:txBody>
-      </p:sp>
-      <p:sp>
-        <p:nvSpPr>
-          <p:cNvPr id="8" name="Rectangle 21">
-            <a:extLst>
-              <a:ext uri="{FF2B5EF4-FFF2-40B4-BE49-F238E27FC236}">
-                <a16:creationId xmlns:a16="http://schemas.microsoft.com/office/drawing/2014/main" id="{E20C08C5-1A40-16B3-02E9-CE38F6DE1D44}"/>
-              </a:ext>
-            </a:extLst>
-          </p:cNvPr>
-          <p:cNvSpPr>
-            <a:spLocks noChangeArrowheads="1"/>
-          </p:cNvSpPr>
-          <p:nvPr/>
-        </p:nvSpPr>
-        <p:spPr bwMode="auto">
-          <a:xfrm>
-            <a:off x="933057" y="2488734"/>
-            <a:ext cx="476250" cy="698500"/>
-          </a:xfrm>
-          <a:prstGeom prst="rect">
-            <a:avLst/>
-          </a:prstGeom>
-          <a:noFill/>
-          <a:ln w="12700">
-            <a:noFill/>
-            <a:miter lim="800000"/>
-            <a:headEnd/>
-            <a:tailEnd/>
-          </a:ln>
-          <a:effectLst/>
-        </p:spPr>
-        <p:txBody>
-          <a:bodyPr lIns="90488" tIns="44450" rIns="90488" bIns="44450">
-            <a:spAutoFit/>
-          </a:bodyPr>
-          <a:lstStyle/>
-          <a:p>
-            <a:pPr defTabSz="739775" eaLnBrk="0" hangingPunct="0">
-              <a:defRPr/>
-            </a:pPr>
-            <a:r>
-              <a:rPr lang="en-US" sz="4000" dirty="0">
-                <a:solidFill>
-                  <a:srgbClr val="FF3300"/>
-                </a:solidFill>
-                <a:latin typeface="Wingdings" pitchFamily="2" charset="2"/>
-              </a:rPr>
-              <a:t></a:t>
             </a:r>
           </a:p>
         </p:txBody>
@@ -29810,6 +29608,13 @@
               <a:srgbClr val="004050"/>
             </a:solidFill>
           </a:ln>
+          <a:effectLst>
+            <a:innerShdw blurRad="63500" dist="50800" dir="13500000">
+              <a:prstClr val="black">
+                <a:alpha val="50000"/>
+              </a:prstClr>
+            </a:innerShdw>
+          </a:effectLst>
         </p:spPr>
         <p:style>
           <a:lnRef idx="2">
@@ -29999,6 +29804,13 @@
               <a:srgbClr val="004050"/>
             </a:solidFill>
           </a:ln>
+          <a:effectLst>
+            <a:innerShdw blurRad="63500" dist="50800" dir="13500000">
+              <a:prstClr val="black">
+                <a:alpha val="50000"/>
+              </a:prstClr>
+            </a:innerShdw>
+          </a:effectLst>
         </p:spPr>
         <p:style>
           <a:lnRef idx="2">
@@ -30780,6 +30592,13 @@
               <a:srgbClr val="004050"/>
             </a:solidFill>
           </a:ln>
+          <a:effectLst>
+            <a:innerShdw blurRad="63500" dist="50800" dir="13500000">
+              <a:prstClr val="black">
+                <a:alpha val="50000"/>
+              </a:prstClr>
+            </a:innerShdw>
+          </a:effectLst>
         </p:spPr>
         <p:style>
           <a:lnRef idx="2">
@@ -30803,7 +30622,7 @@
           <a:p>
             <a:pPr algn="ctr"/>
             <a:r>
-              <a:rPr lang="en-GB" b="1" dirty="0">
+              <a:rPr lang="en-GB" dirty="0">
                 <a:solidFill>
                   <a:schemeClr val="tx1"/>
                 </a:solidFill>
@@ -30811,12 +30630,6 @@
               </a:rPr>
               <a:t>stu1</a:t>
             </a:r>
-            <a:endParaRPr lang="en-GB" sz="1600" b="1" dirty="0">
-              <a:solidFill>
-                <a:schemeClr val="tx1"/>
-              </a:solidFill>
-              <a:cs typeface="Arial" pitchFamily="34" charset="0"/>
-            </a:endParaRPr>
           </a:p>
         </p:txBody>
       </p:sp>
@@ -30884,6 +30697,13 @@
               <a:srgbClr val="004050"/>
             </a:solidFill>
           </a:ln>
+          <a:effectLst>
+            <a:innerShdw blurRad="63500" dist="50800" dir="13500000">
+              <a:prstClr val="black">
+                <a:alpha val="50000"/>
+              </a:prstClr>
+            </a:innerShdw>
+          </a:effectLst>
         </p:spPr>
         <p:style>
           <a:lnRef idx="2">
@@ -30907,7 +30727,7 @@
           <a:p>
             <a:pPr algn="ctr"/>
             <a:r>
-              <a:rPr lang="en-GB" b="1" dirty="0">
+              <a:rPr lang="en-GB" dirty="0">
                 <a:solidFill>
                   <a:schemeClr val="tx1"/>
                 </a:solidFill>
@@ -30915,12 +30735,6 @@
               </a:rPr>
               <a:t>stu2</a:t>
             </a:r>
-            <a:endParaRPr lang="en-GB" sz="1600" b="1" dirty="0">
-              <a:solidFill>
-                <a:schemeClr val="tx1"/>
-              </a:solidFill>
-              <a:cs typeface="Arial" pitchFamily="34" charset="0"/>
-            </a:endParaRPr>
           </a:p>
         </p:txBody>
       </p:sp>
@@ -35197,16 +35011,25 @@
                 </a:solidFill>
                 <a:latin typeface="Lucida Console" pitchFamily="49" charset="0"/>
               </a:rPr>
-              <a:t>    </a:t>
+              <a:t> 	  </a:t>
             </a:r>
             <a:r>
               <a:rPr lang="en-GB" dirty="0" err="1">
                 <a:solidFill>
+                  <a:srgbClr val="000000"/>
+                </a:solidFill>
+                <a:latin typeface="Lucida Console" pitchFamily="49" charset="0"/>
+              </a:rPr>
+              <a:t>aCar</a:t>
+            </a:r>
+            <a:r>
+              <a:rPr lang="en-GB" dirty="0" err="1">
+                <a:solidFill>
                   <a:srgbClr val="FF0000"/>
                 </a:solidFill>
                 <a:latin typeface="Lucida Console" pitchFamily="49" charset="0"/>
               </a:rPr>
-              <a:t>aCar.setOwner</a:t>
+              <a:t>.setOwner</a:t>
             </a:r>
             <a:r>
               <a:rPr lang="en-GB" dirty="0">
@@ -35221,7 +35044,7 @@
                 </a:solidFill>
                 <a:latin typeface="Lucida Console" pitchFamily="49" charset="0"/>
               </a:rPr>
-              <a:t>“Tom“);</a:t>
+              <a:t>"Tom");</a:t>
             </a:r>
           </a:p>
           <a:p>
@@ -36843,6 +36666,32 @@
 </file>
 
 <file path=customXml/item1.xml><?xml version="1.0" encoding="utf-8"?>
+<?mso-contentType ?>
+<FormTemplates xmlns="http://schemas.microsoft.com/sharepoint/v3/contenttype/forms">
+  <Display>DocumentLibraryForm</Display>
+  <Edit>DocumentLibraryForm</Edit>
+  <New>DocumentLibraryForm</New>
+</FormTemplates>
+</file>
+
+<file path=customXml/item2.xml><?xml version="1.0" encoding="utf-8"?>
+<p:properties xmlns:p="http://schemas.microsoft.com/office/2006/metadata/properties" xmlns:xsi="http://www.w3.org/2001/XMLSchema-instance" xmlns:pc="http://schemas.microsoft.com/office/infopath/2007/PartnerControls">
+  <documentManagement>
+    <SequenceNumber xmlns="6794D9DE-4FDF-4DC0-8B2C-5438320C69D5" xsi:nil="true"/>
+    <IsBuildFile xmlns="6794D9DE-4FDF-4DC0-8B2C-5438320C69D5" xsi:nil="true"/>
+    <BookTypeField0 xmlns="6794D9DE-4FDF-4DC0-8B2C-5438320C69D5">
+      <Terms xmlns="http://schemas.microsoft.com/office/infopath/2007/PartnerControls">
+        <TermInfo xmlns="http://schemas.microsoft.com/office/infopath/2007/PartnerControls">
+          <TermName xmlns="http://schemas.microsoft.com/office/infopath/2007/PartnerControls">IK</TermName>
+          <TermId xmlns="http://schemas.microsoft.com/office/infopath/2007/PartnerControls">5abe6401-e87a-4499-80b4-3d21a1a6ebd7</TermId>
+        </TermInfo>
+      </Terms>
+    </BookTypeField0>
+  </documentManagement>
+</p:properties>
+</file>
+
+<file path=customXml/item3.xml><?xml version="1.0" encoding="utf-8"?>
 <ct:contentTypeSchema xmlns:ct="http://schemas.microsoft.com/office/2006/metadata/contentType" xmlns:ma="http://schemas.microsoft.com/office/2006/metadata/properties/metaAttributes" ct:_="" ma:_="" ma:contentTypeName="Courseware" ma:contentTypeID="0x010100F0967B7CEE8D417F966757887D9466FB00B3EF5B1D149FDF49B1880C030D548140" ma:contentTypeVersion="0" ma:contentTypeDescription="Base content type which represents courseware documents" ma:contentTypeScope="" ma:versionID="ab0d7ca79e0ea5a537b031f986da336c">
   <xsd:schema xmlns:xsd="http://www.w3.org/2001/XMLSchema" xmlns:xs="http://www.w3.org/2001/XMLSchema" xmlns:p="http://schemas.microsoft.com/office/2006/metadata/properties" xmlns:ns2="6794D9DE-4FDF-4DC0-8B2C-5438320C69D5" targetNamespace="http://schemas.microsoft.com/office/2006/metadata/properties" ma:root="true" ma:fieldsID="7ff8e7c62cc10108c036e94c947d8fb9" ns2:_="">
     <xsd:import namespace="6794D9DE-4FDF-4DC0-8B2C-5438320C69D5"/>
@@ -36982,33 +36831,25 @@
 </ct:contentTypeSchema>
 </file>
 
-<file path=customXml/item2.xml><?xml version="1.0" encoding="utf-8"?>
-<p:properties xmlns:p="http://schemas.microsoft.com/office/2006/metadata/properties" xmlns:xsi="http://www.w3.org/2001/XMLSchema-instance" xmlns:pc="http://schemas.microsoft.com/office/infopath/2007/PartnerControls">
-  <documentManagement>
-    <SequenceNumber xmlns="6794D9DE-4FDF-4DC0-8B2C-5438320C69D5" xsi:nil="true"/>
-    <IsBuildFile xmlns="6794D9DE-4FDF-4DC0-8B2C-5438320C69D5" xsi:nil="true"/>
-    <BookTypeField0 xmlns="6794D9DE-4FDF-4DC0-8B2C-5438320C69D5">
-      <Terms xmlns="http://schemas.microsoft.com/office/infopath/2007/PartnerControls">
-        <TermInfo xmlns="http://schemas.microsoft.com/office/infopath/2007/PartnerControls">
-          <TermName xmlns="http://schemas.microsoft.com/office/infopath/2007/PartnerControls">IK</TermName>
-          <TermId xmlns="http://schemas.microsoft.com/office/infopath/2007/PartnerControls">5abe6401-e87a-4499-80b4-3d21a1a6ebd7</TermId>
-        </TermInfo>
-      </Terms>
-    </BookTypeField0>
-  </documentManagement>
-</p:properties>
+<file path=customXml/itemProps1.xml><?xml version="1.0" encoding="utf-8"?>
+<ds:datastoreItem xmlns:ds="http://schemas.openxmlformats.org/officeDocument/2006/customXml" ds:itemID="{DA141400-90D0-43B3-B64F-3F2A440B3515}">
+  <ds:schemaRefs>
+    <ds:schemaRef ds:uri="http://schemas.microsoft.com/sharepoint/v3/contenttype/forms"/>
+  </ds:schemaRefs>
+</ds:datastoreItem>
 </file>
 
-<file path=customXml/item3.xml><?xml version="1.0" encoding="utf-8"?>
-<?mso-contentType ?>
-<FormTemplates xmlns="http://schemas.microsoft.com/sharepoint/v3/contenttype/forms">
-  <Display>DocumentLibraryForm</Display>
-  <Edit>DocumentLibraryForm</Edit>
-  <New>DocumentLibraryForm</New>
-</FormTemplates>
+<file path=customXml/itemProps2.xml><?xml version="1.0" encoding="utf-8"?>
+<ds:datastoreItem xmlns:ds="http://schemas.openxmlformats.org/officeDocument/2006/customXml" ds:itemID="{5D50175C-B2BF-4A5C-A0B1-BFF44FE2944E}">
+  <ds:schemaRefs>
+    <ds:schemaRef ds:uri="http://schemas.microsoft.com/office/2006/metadata/properties"/>
+    <ds:schemaRef ds:uri="http://schemas.microsoft.com/office/infopath/2007/PartnerControls"/>
+    <ds:schemaRef ds:uri="6794D9DE-4FDF-4DC0-8B2C-5438320C69D5"/>
+  </ds:schemaRefs>
+</ds:datastoreItem>
 </file>
 
-<file path=customXml/itemProps1.xml><?xml version="1.0" encoding="utf-8"?>
+<file path=customXml/itemProps3.xml><?xml version="1.0" encoding="utf-8"?>
 <ds:datastoreItem xmlns:ds="http://schemas.openxmlformats.org/officeDocument/2006/customXml" ds:itemID="{3271DF08-82F2-4A02-867C-B628BF8B692B}">
   <ds:schemaRefs>
     <ds:schemaRef ds:uri="http://schemas.microsoft.com/office/2006/metadata/contentType"/>
@@ -37024,22 +36865,4 @@
     <ds:schemaRef ds:uri="http://schemas.microsoft.com/internal/obd"/>
   </ds:schemaRefs>
 </ds:datastoreItem>
-</file>
-
-<file path=customXml/itemProps2.xml><?xml version="1.0" encoding="utf-8"?>
-<ds:datastoreItem xmlns:ds="http://schemas.openxmlformats.org/officeDocument/2006/customXml" ds:itemID="{5D50175C-B2BF-4A5C-A0B1-BFF44FE2944E}">
-  <ds:schemaRefs>
-    <ds:schemaRef ds:uri="http://schemas.microsoft.com/office/2006/metadata/properties"/>
-    <ds:schemaRef ds:uri="http://schemas.microsoft.com/office/infopath/2007/PartnerControls"/>
-    <ds:schemaRef ds:uri="6794D9DE-4FDF-4DC0-8B2C-5438320C69D5"/>
-  </ds:schemaRefs>
-</ds:datastoreItem>
-</file>
-
-<file path=customXml/itemProps3.xml><?xml version="1.0" encoding="utf-8"?>
-<ds:datastoreItem xmlns:ds="http://schemas.openxmlformats.org/officeDocument/2006/customXml" ds:itemID="{DA141400-90D0-43B3-B64F-3F2A440B3515}">
-  <ds:schemaRefs>
-    <ds:schemaRef ds:uri="http://schemas.microsoft.com/sharepoint/v3/contenttype/forms"/>
-  </ds:schemaRefs>
-</ds:datastoreItem>
 </file>
</xml_diff>